<commit_message>
Minor tinker and readme file
</commit_message>
<xml_diff>
--- a/Presentation/The fires in Portugal.pptx
+++ b/Presentation/The fires in Portugal.pptx
@@ -20,8 +20,8 @@
     <p:sldId id="269" r:id="rId8"/>
     <p:sldId id="259" r:id="rId9"/>
     <p:sldId id="275" r:id="rId10"/>
-    <p:sldId id="276" r:id="rId11"/>
-    <p:sldId id="277" r:id="rId12"/>
+    <p:sldId id="281" r:id="rId11"/>
+    <p:sldId id="282" r:id="rId12"/>
     <p:sldId id="270" r:id="rId13"/>
     <p:sldId id="273" r:id="rId14"/>
     <p:sldId id="261" r:id="rId15"/>
@@ -820,7 +820,10 @@
           <a:bodyPr/>
           <a:lstStyle/>
           <a:p>
-            <a:endParaRPr lang="pt-PT"/>
+            <a:r>
+              <a:rPr lang="pt-PT" dirty="0"/>
+              <a:t>Only showing the worst 5 months, the worst ones.</a:t>
+            </a:r>
           </a:p>
         </p:txBody>
       </p:sp>
@@ -875,7 +878,7 @@
     </p:spTree>
     <p:extLst>
       <p:ext uri="{BB962C8B-B14F-4D97-AF65-F5344CB8AC3E}">
-        <p14:creationId xmlns:p14="http://schemas.microsoft.com/office/powerpoint/2010/main" val="3810864359"/>
+        <p14:creationId xmlns:p14="http://schemas.microsoft.com/office/powerpoint/2010/main" val="2657044271"/>
       </p:ext>
     </p:extLst>
   </p:cSld>
@@ -929,7 +932,10 @@
           <a:bodyPr/>
           <a:lstStyle/>
           <a:p>
-            <a:endParaRPr lang="pt-PT"/>
+            <a:r>
+              <a:rPr lang="pt-PT" dirty="0"/>
+              <a:t>Only showing the worst 5 months, the worst ones.</a:t>
+            </a:r>
           </a:p>
         </p:txBody>
       </p:sp>
@@ -984,7 +990,7 @@
     </p:spTree>
     <p:extLst>
       <p:ext uri="{BB962C8B-B14F-4D97-AF65-F5344CB8AC3E}">
-        <p14:creationId xmlns:p14="http://schemas.microsoft.com/office/powerpoint/2010/main" val="1738861002"/>
+        <p14:creationId xmlns:p14="http://schemas.microsoft.com/office/powerpoint/2010/main" val="1630937399"/>
       </p:ext>
     </p:extLst>
   </p:cSld>
@@ -1591,7 +1597,7 @@
           <a:p>
             <a:r>
               <a:rPr lang="pt-PT" dirty="0"/>
-              <a:t>Only scratched the surface.</a:t>
+              <a:t>Only scratched the surface, some of the next steps are:</a:t>
             </a:r>
           </a:p>
           <a:p>
@@ -1618,13 +1624,8 @@
             </a:pPr>
             <a:r>
               <a:rPr lang="pt-PT" dirty="0"/>
-              <a:t>Understand why the investigation of fires fails so much in some countys as Pt. </a:t>
-            </a:r>
-            <a:r>
-              <a:rPr lang="pt-PT"/>
-              <a:t>De lima in Viana.</a:t>
-            </a:r>
-            <a:endParaRPr lang="pt-PT" dirty="0"/>
+              <a:t>Understand why the investigation of fires fails so much in some countys as Pt. De lima in Viana.</a:t>
+            </a:r>
           </a:p>
           <a:p>
             <a:pPr marL="171450" indent="-171450">
@@ -7034,12 +7035,47 @@
           <a:chExt cx="0" cy="0"/>
         </a:xfrm>
       </p:grpSpPr>
+      <p:sp>
+        <p:nvSpPr>
+          <p:cNvPr id="2" name="Title 1">
+            <a:extLst>
+              <a:ext uri="{FF2B5EF4-FFF2-40B4-BE49-F238E27FC236}">
+                <a16:creationId xmlns:a16="http://schemas.microsoft.com/office/drawing/2014/main" id="{5EC9E542-460B-71CE-0A94-2D1744C8A330}"/>
+              </a:ext>
+            </a:extLst>
+          </p:cNvPr>
+          <p:cNvSpPr>
+            <a:spLocks noGrp="1"/>
+          </p:cNvSpPr>
+          <p:nvPr>
+            <p:ph type="title"/>
+          </p:nvPr>
+        </p:nvSpPr>
+        <p:spPr>
+          <a:xfrm>
+            <a:off x="8458200" y="1988288"/>
+            <a:ext cx="3161963" cy="2881424"/>
+          </a:xfrm>
+        </p:spPr>
+        <p:txBody>
+          <a:bodyPr>
+            <a:normAutofit fontScale="90000"/>
+          </a:bodyPr>
+          <a:lstStyle/>
+          <a:p>
+            <a:r>
+              <a:rPr lang="pt-PT" dirty="0"/>
+              <a:t>Are the monthly fire count and burnt area distribution the same for all top 5 districts?</a:t>
+            </a:r>
+          </a:p>
+        </p:txBody>
+      </p:sp>
       <p:pic>
         <p:nvPicPr>
           <p:cNvPr id="6" name="Content Placeholder 5">
             <a:extLst>
               <a:ext uri="{FF2B5EF4-FFF2-40B4-BE49-F238E27FC236}">
-                <a16:creationId xmlns:a16="http://schemas.microsoft.com/office/drawing/2014/main" id="{78214A06-CDE0-065D-836C-8C098E1337FB}"/>
+                <a16:creationId xmlns:a16="http://schemas.microsoft.com/office/drawing/2014/main" id="{E372D8BB-3295-DB46-43C8-235AB39FDA3B}"/>
               </a:ext>
             </a:extLst>
           </p:cNvPr>
@@ -7069,63 +7105,16 @@
           </a:xfrm>
         </p:spPr>
       </p:pic>
-      <p:sp>
-        <p:nvSpPr>
-          <p:cNvPr id="2" name="Title 1">
-            <a:extLst>
-              <a:ext uri="{FF2B5EF4-FFF2-40B4-BE49-F238E27FC236}">
-                <a16:creationId xmlns:a16="http://schemas.microsoft.com/office/drawing/2014/main" id="{5EC9E542-460B-71CE-0A94-2D1744C8A330}"/>
-              </a:ext>
-            </a:extLst>
-          </p:cNvPr>
-          <p:cNvSpPr>
-            <a:spLocks noGrp="1"/>
-          </p:cNvSpPr>
-          <p:nvPr>
-            <p:ph type="title"/>
-          </p:nvPr>
-        </p:nvSpPr>
-        <p:spPr>
-          <a:xfrm>
-            <a:off x="8458200" y="2771472"/>
-            <a:ext cx="3161963" cy="1645920"/>
-          </a:xfrm>
-        </p:spPr>
-        <p:txBody>
-          <a:bodyPr>
-            <a:normAutofit fontScale="90000"/>
-          </a:bodyPr>
-          <a:lstStyle/>
-          <a:p>
-            <a:r>
-              <a:rPr lang="pt-PT" dirty="0"/>
-              <a:t>Is the monthly fire count and burnt area distribution the same for all top 5 districts?</a:t>
-            </a:r>
-          </a:p>
-        </p:txBody>
-      </p:sp>
     </p:spTree>
     <p:extLst>
       <p:ext uri="{BB962C8B-B14F-4D97-AF65-F5344CB8AC3E}">
-        <p14:creationId xmlns:p14="http://schemas.microsoft.com/office/powerpoint/2010/main" val="2463697128"/>
+        <p14:creationId xmlns:p14="http://schemas.microsoft.com/office/powerpoint/2010/main" val="1875267913"/>
       </p:ext>
     </p:extLst>
   </p:cSld>
   <p:clrMapOvr>
     <a:masterClrMapping/>
   </p:clrMapOvr>
-  <mc:AlternateContent xmlns:mc="http://schemas.openxmlformats.org/markup-compatibility/2006" xmlns:p159="http://schemas.microsoft.com/office/powerpoint/2015/09/main">
-    <mc:Choice Requires="p159">
-      <p:transition xmlns:p14="http://schemas.microsoft.com/office/powerpoint/2010/main" spd="slow" p14:dur="2000">
-        <p159:morph option="byObject"/>
-      </p:transition>
-    </mc:Choice>
-    <mc:Fallback xmlns="">
-      <p:transition spd="slow">
-        <p:fade/>
-      </p:transition>
-    </mc:Fallback>
-  </mc:AlternateContent>
 </p:sld>
 </file>
 
@@ -7154,12 +7143,47 @@
           <a:chExt cx="0" cy="0"/>
         </a:xfrm>
       </p:grpSpPr>
+      <p:sp>
+        <p:nvSpPr>
+          <p:cNvPr id="2" name="Title 1">
+            <a:extLst>
+              <a:ext uri="{FF2B5EF4-FFF2-40B4-BE49-F238E27FC236}">
+                <a16:creationId xmlns:a16="http://schemas.microsoft.com/office/drawing/2014/main" id="{5EC9E542-460B-71CE-0A94-2D1744C8A330}"/>
+              </a:ext>
+            </a:extLst>
+          </p:cNvPr>
+          <p:cNvSpPr>
+            <a:spLocks noGrp="1"/>
+          </p:cNvSpPr>
+          <p:nvPr>
+            <p:ph type="title"/>
+          </p:nvPr>
+        </p:nvSpPr>
+        <p:spPr>
+          <a:xfrm>
+            <a:off x="8458200" y="1988288"/>
+            <a:ext cx="3161963" cy="2881424"/>
+          </a:xfrm>
+        </p:spPr>
+        <p:txBody>
+          <a:bodyPr>
+            <a:normAutofit fontScale="90000"/>
+          </a:bodyPr>
+          <a:lstStyle/>
+          <a:p>
+            <a:r>
+              <a:rPr lang="pt-PT" dirty="0"/>
+              <a:t>Are the monthly fire count and burnt area distribution the same for all top 5 districts?</a:t>
+            </a:r>
+          </a:p>
+        </p:txBody>
+      </p:sp>
       <p:pic>
         <p:nvPicPr>
           <p:cNvPr id="6" name="Content Placeholder 5">
             <a:extLst>
               <a:ext uri="{FF2B5EF4-FFF2-40B4-BE49-F238E27FC236}">
-                <a16:creationId xmlns:a16="http://schemas.microsoft.com/office/drawing/2014/main" id="{D7F6BA1C-643A-BF54-66F9-4EB2CE5416C2}"/>
+                <a16:creationId xmlns:a16="http://schemas.microsoft.com/office/drawing/2014/main" id="{AD4E12ED-3F34-7520-36BC-720B4160AF1D}"/>
               </a:ext>
             </a:extLst>
           </p:cNvPr>
@@ -7189,63 +7213,16 @@
           </a:xfrm>
         </p:spPr>
       </p:pic>
-      <p:sp>
-        <p:nvSpPr>
-          <p:cNvPr id="2" name="Title 1">
-            <a:extLst>
-              <a:ext uri="{FF2B5EF4-FFF2-40B4-BE49-F238E27FC236}">
-                <a16:creationId xmlns:a16="http://schemas.microsoft.com/office/drawing/2014/main" id="{5EC9E542-460B-71CE-0A94-2D1744C8A330}"/>
-              </a:ext>
-            </a:extLst>
-          </p:cNvPr>
-          <p:cNvSpPr>
-            <a:spLocks noGrp="1"/>
-          </p:cNvSpPr>
-          <p:nvPr>
-            <p:ph type="title"/>
-          </p:nvPr>
-        </p:nvSpPr>
-        <p:spPr>
-          <a:xfrm>
-            <a:off x="8458200" y="2771472"/>
-            <a:ext cx="3161963" cy="1645920"/>
-          </a:xfrm>
-        </p:spPr>
-        <p:txBody>
-          <a:bodyPr>
-            <a:normAutofit fontScale="90000"/>
-          </a:bodyPr>
-          <a:lstStyle/>
-          <a:p>
-            <a:r>
-              <a:rPr lang="pt-PT" dirty="0"/>
-              <a:t>Is the monthly fire count and burnt area distribution the same for all top 5 districts?</a:t>
-            </a:r>
-          </a:p>
-        </p:txBody>
-      </p:sp>
     </p:spTree>
     <p:extLst>
       <p:ext uri="{BB962C8B-B14F-4D97-AF65-F5344CB8AC3E}">
-        <p14:creationId xmlns:p14="http://schemas.microsoft.com/office/powerpoint/2010/main" val="1948297159"/>
+        <p14:creationId xmlns:p14="http://schemas.microsoft.com/office/powerpoint/2010/main" val="1914119302"/>
       </p:ext>
     </p:extLst>
   </p:cSld>
   <p:clrMapOvr>
     <a:masterClrMapping/>
   </p:clrMapOvr>
-  <mc:AlternateContent xmlns:mc="http://schemas.openxmlformats.org/markup-compatibility/2006" xmlns:p159="http://schemas.microsoft.com/office/powerpoint/2015/09/main">
-    <mc:Choice Requires="p159">
-      <p:transition xmlns:p14="http://schemas.microsoft.com/office/powerpoint/2010/main" spd="slow" p14:dur="2000">
-        <p159:morph option="byObject"/>
-      </p:transition>
-    </mc:Choice>
-    <mc:Fallback xmlns="">
-      <p:transition spd="slow">
-        <p:fade/>
-      </p:transition>
-    </mc:Fallback>
-  </mc:AlternateContent>
 </p:sld>
 </file>
 
@@ -8417,7 +8394,7 @@
           <a:p>
             <a:r>
               <a:rPr lang="pt-PT" dirty="0"/>
-              <a:t>The original data can’t be used without real cleaning, if a model is built arround this data it will completly skew the reality.</a:t>
+              <a:t>The original data can’t be used without real cleaning, if a model is built around this data it will completely skew the reality.</a:t>
             </a:r>
           </a:p>
           <a:p>
@@ -8919,7 +8896,7 @@
           <a:p>
             <a:r>
               <a:rPr lang="pt-PT" sz="3200" dirty="0"/>
-              <a:t>Re-ignition is a serious problem, significant resources should be allocated in the aftermath of fire.</a:t>
+              <a:t>Re-ignition is a serious problem, significant resources should be allocated in the aftermath of the fire.</a:t>
             </a:r>
           </a:p>
           <a:p>
@@ -9954,15 +9931,13 @@
             <a:endParaRPr lang="pt-PT" dirty="0"/>
           </a:p>
           <a:p>
+            <a:r>
+              <a:rPr lang="en-US" dirty="0"/>
+              <a:t>Different types of terrain have their hot spots.</a:t>
+            </a:r>
             <a:endParaRPr lang="pt-PT" dirty="0"/>
           </a:p>
           <a:p>
-            <a:r>
-              <a:rPr lang="pt-PT" dirty="0"/>
-              <a:t>Diferent types of terrain have their own hot spots.</a:t>
-            </a:r>
-          </a:p>
-          <a:p>
             <a:endParaRPr lang="pt-PT" dirty="0"/>
           </a:p>
           <a:p>
@@ -9972,12 +9947,9 @@
             <a:endParaRPr lang="pt-PT" dirty="0"/>
           </a:p>
           <a:p>
-            <a:endParaRPr lang="pt-PT" dirty="0"/>
-          </a:p>
-          <a:p>
             <a:r>
               <a:rPr lang="pt-PT" sz="1200" dirty="0"/>
-              <a:t>2017 excluded since it was an abnormal year and completly skews the reality.</a:t>
+              <a:t>2017 was excluded since it was an abnormal year and completely skews the reality.</a:t>
             </a:r>
           </a:p>
         </p:txBody>
@@ -10063,7 +10035,7 @@
                                         <p:tgtEl>
                                           <p:spTgt spid="4">
                                             <p:txEl>
-                                              <p:pRg st="2" end="2"/>
+                                              <p:pRg st="5" end="5"/>
                                             </p:txEl>
                                           </p:spTgt>
                                         </p:tgtEl>
@@ -10081,7 +10053,7 @@
                                         <p:tgtEl>
                                           <p:spTgt spid="4">
                                             <p:txEl>
-                                              <p:pRg st="2" end="2"/>
+                                              <p:pRg st="5" end="5"/>
                                             </p:txEl>
                                           </p:spTgt>
                                         </p:tgtEl>
@@ -10093,7 +10065,7 @@
                                         <p:tgtEl>
                                           <p:spTgt spid="4">
                                             <p:txEl>
-                                              <p:pRg st="2" end="2"/>
+                                              <p:pRg st="5" end="5"/>
                                             </p:txEl>
                                           </p:spTgt>
                                         </p:tgtEl>
@@ -10120,104 +10092,7 @@
                                         <p:tgtEl>
                                           <p:spTgt spid="4">
                                             <p:txEl>
-                                              <p:pRg st="2" end="2"/>
-                                            </p:txEl>
-                                          </p:spTgt>
-                                        </p:tgtEl>
-                                        <p:attrNameLst>
-                                          <p:attrName>ppt_y</p:attrName>
-                                        </p:attrNameLst>
-                                      </p:cBhvr>
-                                      <p:tavLst>
-                                        <p:tav tm="0">
-                                          <p:val>
-                                            <p:strVal val="#ppt_y+.1"/>
-                                          </p:val>
-                                        </p:tav>
-                                        <p:tav tm="100000">
-                                          <p:val>
-                                            <p:strVal val="#ppt_y"/>
-                                          </p:val>
-                                        </p:tav>
-                                      </p:tavLst>
-                                    </p:anim>
-                                  </p:childTnLst>
-                                </p:cTn>
-                              </p:par>
-                              <p:par>
-                                <p:cTn id="10" presetID="42" presetClass="entr" presetSubtype="0" fill="hold" grpId="0" nodeType="withEffect">
-                                  <p:stCondLst>
-                                    <p:cond delay="0"/>
-                                  </p:stCondLst>
-                                  <p:childTnLst>
-                                    <p:set>
-                                      <p:cBhvr>
-                                        <p:cTn id="11" dur="1" fill="hold">
-                                          <p:stCondLst>
-                                            <p:cond delay="0"/>
-                                          </p:stCondLst>
-                                        </p:cTn>
-                                        <p:tgtEl>
-                                          <p:spTgt spid="4">
-                                            <p:txEl>
-                                              <p:pRg st="7" end="7"/>
-                                            </p:txEl>
-                                          </p:spTgt>
-                                        </p:tgtEl>
-                                        <p:attrNameLst>
-                                          <p:attrName>style.visibility</p:attrName>
-                                        </p:attrNameLst>
-                                      </p:cBhvr>
-                                      <p:to>
-                                        <p:strVal val="visible"/>
-                                      </p:to>
-                                    </p:set>
-                                    <p:animEffect transition="in" filter="fade">
-                                      <p:cBhvr>
-                                        <p:cTn id="12" dur="1000"/>
-                                        <p:tgtEl>
-                                          <p:spTgt spid="4">
-                                            <p:txEl>
-                                              <p:pRg st="7" end="7"/>
-                                            </p:txEl>
-                                          </p:spTgt>
-                                        </p:tgtEl>
-                                      </p:cBhvr>
-                                    </p:animEffect>
-                                    <p:anim calcmode="lin" valueType="num">
-                                      <p:cBhvr>
-                                        <p:cTn id="13" dur="1000" fill="hold"/>
-                                        <p:tgtEl>
-                                          <p:spTgt spid="4">
-                                            <p:txEl>
-                                              <p:pRg st="7" end="7"/>
-                                            </p:txEl>
-                                          </p:spTgt>
-                                        </p:tgtEl>
-                                        <p:attrNameLst>
-                                          <p:attrName>ppt_x</p:attrName>
-                                        </p:attrNameLst>
-                                      </p:cBhvr>
-                                      <p:tavLst>
-                                        <p:tav tm="0">
-                                          <p:val>
-                                            <p:strVal val="#ppt_x"/>
-                                          </p:val>
-                                        </p:tav>
-                                        <p:tav tm="100000">
-                                          <p:val>
-                                            <p:strVal val="#ppt_x"/>
-                                          </p:val>
-                                        </p:tav>
-                                      </p:tavLst>
-                                    </p:anim>
-                                    <p:anim calcmode="lin" valueType="num">
-                                      <p:cBhvr>
-                                        <p:cTn id="14" dur="1000" fill="hold"/>
-                                        <p:tgtEl>
-                                          <p:spTgt spid="4">
-                                            <p:txEl>
-                                              <p:pRg st="7" end="7"/>
+                                              <p:pRg st="5" end="5"/>
                                             </p:txEl>
                                           </p:spTgt>
                                         </p:tgtEl>
@@ -10363,15 +10238,13 @@
             <a:endParaRPr lang="pt-PT" dirty="0"/>
           </a:p>
           <a:p>
+            <a:r>
+              <a:rPr lang="en-US" dirty="0"/>
+              <a:t>Different types of terrain have their hot spots.</a:t>
+            </a:r>
             <a:endParaRPr lang="pt-PT" dirty="0"/>
           </a:p>
           <a:p>
-            <a:r>
-              <a:rPr lang="pt-PT" dirty="0"/>
-              <a:t>Diferent types of terrain have their own hot spots.</a:t>
-            </a:r>
-          </a:p>
-          <a:p>
             <a:endParaRPr lang="pt-PT" dirty="0"/>
           </a:p>
           <a:p>
@@ -10381,12 +10254,9 @@
             <a:endParaRPr lang="pt-PT" dirty="0"/>
           </a:p>
           <a:p>
-            <a:endParaRPr lang="pt-PT" dirty="0"/>
-          </a:p>
-          <a:p>
             <a:r>
               <a:rPr lang="pt-PT" sz="1200" dirty="0"/>
-              <a:t>2017 excluded since it was an abnormal year and completly skews the reality.</a:t>
+              <a:t>2017 was excluded since it was an abnormal year and completely skews the reality.</a:t>
             </a:r>
           </a:p>
         </p:txBody>
@@ -10539,15 +10409,13 @@
             <a:endParaRPr lang="pt-PT" dirty="0"/>
           </a:p>
           <a:p>
+            <a:r>
+              <a:rPr lang="en-US" dirty="0"/>
+              <a:t>Different types of terrain have their hot spots.</a:t>
+            </a:r>
             <a:endParaRPr lang="pt-PT" dirty="0"/>
           </a:p>
           <a:p>
-            <a:r>
-              <a:rPr lang="pt-PT" dirty="0"/>
-              <a:t>Diferent types of terrain have their own hot spots.</a:t>
-            </a:r>
-          </a:p>
-          <a:p>
             <a:endParaRPr lang="pt-PT" dirty="0"/>
           </a:p>
           <a:p>
@@ -10557,12 +10425,9 @@
             <a:endParaRPr lang="pt-PT" dirty="0"/>
           </a:p>
           <a:p>
-            <a:endParaRPr lang="pt-PT" dirty="0"/>
-          </a:p>
-          <a:p>
             <a:r>
               <a:rPr lang="pt-PT" sz="1200" dirty="0"/>
-              <a:t>2017 excluded since it was an abnormal year and completly skews the reality.</a:t>
+              <a:t>2017 was excluded since it was an abnormal year and completely skews the reality.</a:t>
             </a:r>
           </a:p>
         </p:txBody>
@@ -10708,7 +10573,7 @@
           <a:p>
             <a:r>
               <a:rPr lang="pt-PT" dirty="0"/>
-              <a:t>A lot of factors come into play, but the emissions generated by the fires are actually the biggest problem as they affect the quality of the air.</a:t>
+              <a:t>A lot of factors come into play, but the emissions generated by the fires are the biggest problem as they affect the quality of the air.</a:t>
             </a:r>
           </a:p>
           <a:p>
@@ -11580,7 +11445,7 @@
             </a:r>
             <a:r>
               <a:rPr lang="pt-PT" sz="1600" dirty="0"/>
-              <a:t>, but we can look deeper and see interesting results as:</a:t>
+              <a:t>, but we can look deeper and see interesting results:</a:t>
             </a:r>
           </a:p>
           <a:p>
@@ -11610,7 +11475,7 @@
             </a:pPr>
             <a:r>
               <a:rPr lang="pt-PT" sz="1400" dirty="0"/>
-              <a:t>The number of fires is actually decreasing.</a:t>
+              <a:t>The number of fires is decreasing.</a:t>
             </a:r>
           </a:p>
         </p:txBody>
@@ -12183,8 +12048,8 @@
         </p:nvSpPr>
         <p:spPr>
           <a:xfrm>
-            <a:off x="8458200" y="2771472"/>
-            <a:ext cx="3161963" cy="1645920"/>
+            <a:off x="8458200" y="1988288"/>
+            <a:ext cx="3161963" cy="2881424"/>
           </a:xfrm>
         </p:spPr>
         <p:txBody>
@@ -12195,7 +12060,7 @@
           <a:p>
             <a:r>
               <a:rPr lang="pt-PT" dirty="0"/>
-              <a:t>Is the monthly fire count and burnt area distribution the same for all top 5 districts?</a:t>
+              <a:t>Are the monthly fire count and burnt area distribution the same for all top 5 districts?</a:t>
             </a:r>
           </a:p>
         </p:txBody>

</xml_diff>